<commit_message>
Re-export the small polishings
</commit_message>
<xml_diff>
--- a/slides/15.SMALL-POLISHINGS.pptx
+++ b/slides/15.SMALL-POLISHINGS.pptx
@@ -2759,7 +2759,7 @@
         <p:spPr>
           <a:xfrm>
             <a:off x="554760" y="1554480"/>
-            <a:ext cx="7765200" cy="1462680"/>
+            <a:ext cx="7764840" cy="1462320"/>
           </a:xfrm>
           <a:prstGeom prst="rect">
             <a:avLst/>
@@ -2832,7 +2832,7 @@
         <p:spPr>
           <a:xfrm>
             <a:off x="1370160" y="5446080"/>
-            <a:ext cx="6393600" cy="1745280"/>
+            <a:ext cx="6393240" cy="1744920"/>
           </a:xfrm>
           <a:prstGeom prst="rect">
             <a:avLst/>
@@ -2926,7 +2926,7 @@
         <p:spPr>
           <a:xfrm>
             <a:off x="917640" y="779400"/>
-            <a:ext cx="7765200" cy="1462680"/>
+            <a:ext cx="7764840" cy="1462320"/>
           </a:xfrm>
           <a:prstGeom prst="rect">
             <a:avLst/>
@@ -2973,7 +2973,7 @@
         <p:spPr>
           <a:xfrm>
             <a:off x="548640" y="2035440"/>
-            <a:ext cx="8133480" cy="4547160"/>
+            <a:ext cx="7955280" cy="4546800"/>
           </a:xfrm>
           <a:prstGeom prst="rect">
             <a:avLst/>
@@ -3002,6 +3002,12 @@
               </a:rPr>
               <a:t>Намерете услуга( service ) за проблем които искате да решите. </a:t>
             </a:r>
+            <a:endParaRPr/>
+          </a:p>
+          <a:p>
+            <a:endParaRPr/>
+          </a:p>
+          <a:p>
             <a:r>
               <a:rPr lang="en-US" sz="2400" strike="noStrike">
                 <a:solidFill>
@@ -3010,9 +3016,11 @@
                 <a:latin typeface="Arial"/>
                 <a:ea typeface="DejaVu Sans"/>
               </a:rPr>
-              <a:t>
-</a:t>
-            </a:r>
+              <a:t>- Изпращане на майл</a:t>
+            </a:r>
+            <a:endParaRPr/>
+          </a:p>
+          <a:p>
             <a:r>
               <a:rPr lang="en-US" sz="2400" strike="noStrike">
                 <a:solidFill>
@@ -3021,7 +3029,7 @@
                 <a:latin typeface="Arial"/>
                 <a:ea typeface="DejaVu Sans"/>
               </a:rPr>
-              <a:t>- Изпращане на майл</a:t>
+              <a:t>- Качване на снимка </a:t>
             </a:r>
             <a:endParaRPr/>
           </a:p>
@@ -3034,8 +3042,11 @@
                 <a:latin typeface="Arial"/>
                 <a:ea typeface="DejaVu Sans"/>
               </a:rPr>
-              <a:t>- Качване на снимка </a:t>
-            </a:r>
+              <a:t>- Тн.</a:t>
+            </a:r>
+            <a:endParaRPr/>
+          </a:p>
+          <a:p>
             <a:endParaRPr/>
           </a:p>
           <a:p>
@@ -3047,11 +3058,8 @@
                 <a:latin typeface="Arial"/>
                 <a:ea typeface="DejaVu Sans"/>
               </a:rPr>
-              <a:t>- Тн.</a:t>
-            </a:r>
-            <a:endParaRPr/>
-          </a:p>
-          <a:p>
+              <a:t>Опитайте се да го имплементирате.</a:t>
+            </a:r>
             <a:endParaRPr/>
           </a:p>
           <a:p>
@@ -3063,40 +3071,11 @@
                 <a:latin typeface="Arial"/>
                 <a:ea typeface="DejaVu Sans"/>
               </a:rPr>
-              <a:t>Опитайте се да го имплементирате.</a:t>
-            </a:r>
-            <a:r>
-              <a:rPr lang="en-US" sz="2400" strike="noStrike">
-                <a:solidFill>
-                  <a:srgbClr val="ffffff"/>
-                </a:solidFill>
-                <a:latin typeface="Arial"/>
-                <a:ea typeface="DejaVu Sans"/>
-              </a:rPr>
-              <a:t>
-</a:t>
-            </a:r>
-            <a:r>
-              <a:rPr lang="en-US" sz="2400" strike="noStrike">
-                <a:solidFill>
-                  <a:srgbClr val="ffffff"/>
-                </a:solidFill>
-                <a:latin typeface="Arial"/>
-                <a:ea typeface="DejaVu Sans"/>
-              </a:rPr>
               <a:t>Следващия час ще обясните:</a:t>
             </a:r>
-            <a:r>
-              <a:rPr lang="en-US" sz="2400" strike="noStrike">
-                <a:solidFill>
-                  <a:srgbClr val="ffffff"/>
-                </a:solidFill>
-                <a:latin typeface="Arial"/>
-                <a:ea typeface="DejaVu Sans"/>
-              </a:rPr>
-              <a:t>
-</a:t>
-            </a:r>
+            <a:endParaRPr/>
+          </a:p>
+          <a:p>
             <a:r>
               <a:rPr lang="en-US" sz="2400" strike="noStrike">
                 <a:solidFill>
@@ -3169,7 +3148,7 @@
         <p:spPr>
           <a:xfrm>
             <a:off x="3111840" y="2468880"/>
-            <a:ext cx="8222400" cy="1135800"/>
+            <a:ext cx="8222040" cy="1135440"/>
           </a:xfrm>
           <a:prstGeom prst="rect">
             <a:avLst/>
@@ -3216,7 +3195,7 @@
         <p:spPr>
           <a:xfrm>
             <a:off x="762120" y="1676520"/>
-            <a:ext cx="7612920" cy="4518720"/>
+            <a:ext cx="7612560" cy="4518360"/>
           </a:xfrm>
           <a:prstGeom prst="rect">
             <a:avLst/>
@@ -3281,7 +3260,7 @@
         <p:spPr>
           <a:xfrm>
             <a:off x="6727680" y="3984480"/>
-            <a:ext cx="2412000" cy="2412000"/>
+            <a:ext cx="2411640" cy="2411640"/>
           </a:xfrm>
           <a:prstGeom prst="rect">
             <a:avLst/>
@@ -3349,7 +3328,7 @@
         <p:spPr>
           <a:xfrm>
             <a:off x="917640" y="779400"/>
-            <a:ext cx="7765200" cy="956880"/>
+            <a:ext cx="7764840" cy="956520"/>
           </a:xfrm>
           <a:prstGeom prst="rect">
             <a:avLst/>
@@ -3396,7 +3375,7 @@
         <p:spPr>
           <a:xfrm>
             <a:off x="552240" y="2286000"/>
-            <a:ext cx="8133480" cy="4547160"/>
+            <a:ext cx="8133120" cy="4546800"/>
           </a:xfrm>
           <a:prstGeom prst="rect">
             <a:avLst/>
@@ -3516,7 +3495,7 @@
         <p:spPr>
           <a:xfrm>
             <a:off x="917640" y="779400"/>
-            <a:ext cx="7765200" cy="1462680"/>
+            <a:ext cx="7764840" cy="1462320"/>
           </a:xfrm>
           <a:prstGeom prst="rect">
             <a:avLst/>
@@ -3563,7 +3542,7 @@
         <p:spPr>
           <a:xfrm>
             <a:off x="548640" y="2035440"/>
-            <a:ext cx="8133480" cy="4547160"/>
+            <a:ext cx="8133120" cy="4546800"/>
           </a:xfrm>
           <a:prstGeom prst="rect">
             <a:avLst/>
@@ -3583,8 +3562,11 @@
           <a:bodyPr lIns="90000" rIns="90000" tIns="45000" bIns="45000"/>
           <a:p>
             <a:pPr>
+              <a:lnSpc>
+                <a:spcPct val="100000"/>
+              </a:lnSpc>
               <a:buFont typeface="StarSymbol"/>
-              <a:buChar char=""/>
+              <a:buChar char="l"/>
             </a:pPr>
             <a:r>
               <a:rPr lang="en-US" sz="2400" strike="noStrike">
@@ -3600,8 +3582,11 @@
           </a:p>
           <a:p>
             <a:pPr>
+              <a:lnSpc>
+                <a:spcPct val="100000"/>
+              </a:lnSpc>
               <a:buFont typeface="StarSymbol"/>
-              <a:buChar char=""/>
+              <a:buChar char="l"/>
             </a:pPr>
             <a:r>
               <a:rPr lang="en-US" sz="2400" strike="noStrike">
@@ -3617,8 +3602,11 @@
           </a:p>
           <a:p>
             <a:pPr>
+              <a:lnSpc>
+                <a:spcPct val="100000"/>
+              </a:lnSpc>
               <a:buFont typeface="StarSymbol"/>
-              <a:buChar char=""/>
+              <a:buChar char="l"/>
             </a:pPr>
             <a:r>
               <a:rPr lang="en-US" sz="2400" strike="noStrike">
@@ -3634,8 +3622,11 @@
           </a:p>
           <a:p>
             <a:pPr>
+              <a:lnSpc>
+                <a:spcPct val="100000"/>
+              </a:lnSpc>
               <a:buFont typeface="StarSymbol"/>
-              <a:buChar char=""/>
+              <a:buChar char="l"/>
             </a:pPr>
             <a:r>
               <a:rPr lang="en-US" sz="2400" strike="noStrike">
@@ -3651,8 +3642,11 @@
           </a:p>
           <a:p>
             <a:pPr>
+              <a:lnSpc>
+                <a:spcPct val="100000"/>
+              </a:lnSpc>
               <a:buFont typeface="StarSymbol"/>
-              <a:buChar char=""/>
+              <a:buChar char="l"/>
             </a:pPr>
             <a:r>
               <a:rPr lang="en-US" sz="2400" strike="noStrike">
@@ -3668,8 +3662,11 @@
           </a:p>
           <a:p>
             <a:pPr>
+              <a:lnSpc>
+                <a:spcPct val="100000"/>
+              </a:lnSpc>
               <a:buFont typeface="StarSymbol"/>
-              <a:buChar char=""/>
+              <a:buChar char="l"/>
             </a:pPr>
             <a:r>
               <a:rPr lang="en-US" sz="2400" strike="noStrike">
@@ -3743,7 +3740,7 @@
         <p:spPr>
           <a:xfrm>
             <a:off x="640080" y="2742120"/>
-            <a:ext cx="7765200" cy="1462680"/>
+            <a:ext cx="7764840" cy="1462320"/>
           </a:xfrm>
           <a:prstGeom prst="rect">
             <a:avLst/>
@@ -3839,7 +3836,7 @@
         <p:spPr>
           <a:xfrm>
             <a:off x="917640" y="779400"/>
-            <a:ext cx="7765200" cy="1462680"/>
+            <a:ext cx="7764840" cy="1462320"/>
           </a:xfrm>
           <a:prstGeom prst="rect">
             <a:avLst/>
@@ -3886,7 +3883,7 @@
         <p:spPr>
           <a:xfrm>
             <a:off x="1188720" y="2493000"/>
-            <a:ext cx="8133480" cy="4547160"/>
+            <a:ext cx="8133120" cy="4546800"/>
           </a:xfrm>
           <a:prstGeom prst="rect">
             <a:avLst/>
@@ -3993,7 +3990,7 @@
         <p:spPr>
           <a:xfrm>
             <a:off x="917640" y="779400"/>
-            <a:ext cx="7765200" cy="1462680"/>
+            <a:ext cx="7764840" cy="1462320"/>
           </a:xfrm>
           <a:prstGeom prst="rect">
             <a:avLst/>
@@ -4040,7 +4037,7 @@
         <p:spPr>
           <a:xfrm>
             <a:off x="640080" y="2651760"/>
-            <a:ext cx="8133480" cy="4547160"/>
+            <a:ext cx="8133120" cy="4546800"/>
           </a:xfrm>
           <a:prstGeom prst="rect">
             <a:avLst/>
@@ -4060,8 +4057,11 @@
           <a:bodyPr lIns="90000" rIns="90000" tIns="45000" bIns="45000"/>
           <a:p>
             <a:pPr>
+              <a:lnSpc>
+                <a:spcPct val="100000"/>
+              </a:lnSpc>
               <a:buFont typeface="StarSymbol"/>
-              <a:buChar char=""/>
+              <a:buChar char="l"/>
             </a:pPr>
             <a:r>
               <a:rPr lang="en-US" sz="2400" strike="noStrike">
@@ -4077,8 +4077,11 @@
           </a:p>
           <a:p>
             <a:pPr>
+              <a:lnSpc>
+                <a:spcPct val="100000"/>
+              </a:lnSpc>
               <a:buFont typeface="StarSymbol"/>
-              <a:buChar char=""/>
+              <a:buChar char="l"/>
             </a:pPr>
             <a:r>
               <a:rPr lang="en-US" sz="2400" strike="noStrike">
@@ -4094,8 +4097,11 @@
           </a:p>
           <a:p>
             <a:pPr>
+              <a:lnSpc>
+                <a:spcPct val="100000"/>
+              </a:lnSpc>
               <a:buFont typeface="StarSymbol"/>
-              <a:buChar char=""/>
+              <a:buChar char="l"/>
             </a:pPr>
             <a:r>
               <a:rPr lang="en-US" sz="2400" strike="noStrike">
@@ -4111,8 +4117,11 @@
           </a:p>
           <a:p>
             <a:pPr>
+              <a:lnSpc>
+                <a:spcPct val="100000"/>
+              </a:lnSpc>
               <a:buFont typeface="StarSymbol"/>
-              <a:buChar char=""/>
+              <a:buChar char="l"/>
             </a:pPr>
             <a:r>
               <a:rPr lang="en-US" sz="2400" strike="noStrike">
@@ -4186,7 +4195,7 @@
         <p:spPr>
           <a:xfrm>
             <a:off x="917640" y="779400"/>
-            <a:ext cx="7765200" cy="1462680"/>
+            <a:ext cx="7764840" cy="1462320"/>
           </a:xfrm>
           <a:prstGeom prst="rect">
             <a:avLst/>
@@ -4233,7 +4242,7 @@
         <p:spPr>
           <a:xfrm>
             <a:off x="548640" y="2035440"/>
-            <a:ext cx="8133480" cy="4547160"/>
+            <a:ext cx="8133120" cy="4546800"/>
           </a:xfrm>
           <a:prstGeom prst="rect">
             <a:avLst/>
@@ -4278,7 +4287,7 @@
                 <a:spcPct val="100000"/>
               </a:lnSpc>
               <a:buFont typeface="StarSymbol"/>
-              <a:buChar char=""/>
+              <a:buChar char="l"/>
             </a:pPr>
             <a:r>
               <a:rPr lang="en-US" sz="2400" strike="noStrike">
@@ -4298,7 +4307,7 @@
                 <a:spcPct val="100000"/>
               </a:lnSpc>
               <a:buFont typeface="StarSymbol"/>
-              <a:buChar char=""/>
+              <a:buChar char="l"/>
             </a:pPr>
             <a:r>
               <a:rPr lang="en-US" sz="2400" strike="noStrike">
@@ -4372,7 +4381,7 @@
         <p:spPr>
           <a:xfrm>
             <a:off x="917640" y="779400"/>
-            <a:ext cx="7765200" cy="1462680"/>
+            <a:ext cx="7764840" cy="1462320"/>
           </a:xfrm>
           <a:prstGeom prst="rect">
             <a:avLst/>
@@ -4419,7 +4428,7 @@
         <p:spPr>
           <a:xfrm>
             <a:off x="548640" y="2035440"/>
-            <a:ext cx="8133480" cy="4547160"/>
+            <a:ext cx="8133120" cy="4546800"/>
           </a:xfrm>
           <a:prstGeom prst="rect">
             <a:avLst/>
@@ -4544,7 +4553,7 @@
         <p:spPr>
           <a:xfrm>
             <a:off x="917640" y="779400"/>
-            <a:ext cx="7765200" cy="1462680"/>
+            <a:ext cx="7764840" cy="1462320"/>
           </a:xfrm>
           <a:prstGeom prst="rect">
             <a:avLst/>
@@ -4591,7 +4600,7 @@
         <p:spPr>
           <a:xfrm>
             <a:off x="548640" y="2035440"/>
-            <a:ext cx="8133480" cy="4547160"/>
+            <a:ext cx="8133120" cy="4546800"/>
           </a:xfrm>
           <a:prstGeom prst="rect">
             <a:avLst/>

</xml_diff>